<commit_message>
adds README.md and qiita.md
</commit_message>
<xml_diff>
--- a/fig.pptx
+++ b/fig.pptx
@@ -9,6 +9,7 @@
     <p:sldId id="259" r:id="rId3"/>
     <p:sldId id="257" r:id="rId4"/>
     <p:sldId id="258" r:id="rId5"/>
+    <p:sldId id="260" r:id="rId6"/>
   </p:sldIdLst>
   <p:sldSz cx="12192000" cy="6858000"/>
   <p:notesSz cx="6858000" cy="9144000"/>
@@ -107,6 +108,11 @@
       </a:defRPr>
     </a:lvl9pPr>
   </p:defaultTextStyle>
+  <p:extLst>
+    <p:ext uri="{EFAFB233-063F-42B5-8137-9DF3F51BA10A}">
+      <p15:sldGuideLst xmlns:p15="http://schemas.microsoft.com/office/powerpoint/2012/main"/>
+    </p:ext>
+  </p:extLst>
 </p:presentation>
 </file>
 
@@ -3128,6 +3134,1313 @@
 </p:sld>
 </file>
 
+<file path=ppt/slides/slide5.xml><?xml version="1.0" encoding="utf-8"?>
+<p:sld xmlns:a="http://schemas.openxmlformats.org/drawingml/2006/main" xmlns:r="http://schemas.openxmlformats.org/officeDocument/2006/relationships" xmlns:p="http://schemas.openxmlformats.org/presentationml/2006/main">
+  <p:cSld>
+    <p:spTree>
+      <p:nvGrpSpPr>
+        <p:cNvPr id="1" name=""/>
+        <p:cNvGrpSpPr/>
+        <p:nvPr/>
+      </p:nvGrpSpPr>
+      <p:grpSpPr>
+        <a:xfrm>
+          <a:off x="0" y="0"/>
+          <a:ext cx="0" cy="0"/>
+          <a:chOff x="0" y="0"/>
+          <a:chExt cx="0" cy="0"/>
+        </a:xfrm>
+      </p:grpSpPr>
+      <p:sp>
+        <p:nvSpPr>
+          <p:cNvPr id="3" name="楕円 2"/>
+          <p:cNvSpPr/>
+          <p:nvPr/>
+        </p:nvSpPr>
+        <p:spPr>
+          <a:xfrm>
+            <a:off x="2509624" y="2708920"/>
+            <a:ext cx="720080" cy="720080"/>
+          </a:xfrm>
+          <a:prstGeom prst="ellipse">
+            <a:avLst/>
+          </a:prstGeom>
+          <a:solidFill>
+            <a:schemeClr val="bg1"/>
+          </a:solidFill>
+          <a:ln>
+            <a:solidFill>
+              <a:schemeClr val="tx1"/>
+            </a:solidFill>
+          </a:ln>
+        </p:spPr>
+        <p:style>
+          <a:lnRef idx="2">
+            <a:schemeClr val="accent1">
+              <a:shade val="50000"/>
+            </a:schemeClr>
+          </a:lnRef>
+          <a:fillRef idx="1">
+            <a:schemeClr val="accent1"/>
+          </a:fillRef>
+          <a:effectRef idx="0">
+            <a:schemeClr val="accent1"/>
+          </a:effectRef>
+          <a:fontRef idx="minor">
+            <a:schemeClr val="lt1"/>
+          </a:fontRef>
+        </p:style>
+        <p:txBody>
+          <a:bodyPr rtlCol="0" anchor="ctr"/>
+          <a:lstStyle/>
+          <a:p>
+            <a:pPr algn="ctr"/>
+            <a:endParaRPr kumimoji="1" lang="ja-JP" altLang="en-US"/>
+          </a:p>
+        </p:txBody>
+      </p:sp>
+      <p:sp>
+        <p:nvSpPr>
+          <p:cNvPr id="4" name="楕円 3"/>
+          <p:cNvSpPr/>
+          <p:nvPr/>
+        </p:nvSpPr>
+        <p:spPr>
+          <a:xfrm>
+            <a:off x="1806496" y="4149080"/>
+            <a:ext cx="720080" cy="720080"/>
+          </a:xfrm>
+          <a:prstGeom prst="ellipse">
+            <a:avLst/>
+          </a:prstGeom>
+          <a:solidFill>
+            <a:schemeClr val="bg1"/>
+          </a:solidFill>
+          <a:ln>
+            <a:solidFill>
+              <a:schemeClr val="tx1"/>
+            </a:solidFill>
+          </a:ln>
+        </p:spPr>
+        <p:style>
+          <a:lnRef idx="2">
+            <a:schemeClr val="accent1">
+              <a:shade val="50000"/>
+            </a:schemeClr>
+          </a:lnRef>
+          <a:fillRef idx="1">
+            <a:schemeClr val="accent1"/>
+          </a:fillRef>
+          <a:effectRef idx="0">
+            <a:schemeClr val="accent1"/>
+          </a:effectRef>
+          <a:fontRef idx="minor">
+            <a:schemeClr val="lt1"/>
+          </a:fontRef>
+        </p:style>
+        <p:txBody>
+          <a:bodyPr rtlCol="0" anchor="ctr"/>
+          <a:lstStyle/>
+          <a:p>
+            <a:pPr algn="ctr"/>
+            <a:endParaRPr kumimoji="1" lang="ja-JP" altLang="en-US"/>
+          </a:p>
+        </p:txBody>
+      </p:sp>
+      <p:sp>
+        <p:nvSpPr>
+          <p:cNvPr id="5" name="楕円 4"/>
+          <p:cNvSpPr/>
+          <p:nvPr/>
+        </p:nvSpPr>
+        <p:spPr>
+          <a:xfrm>
+            <a:off x="3215680" y="4149080"/>
+            <a:ext cx="720080" cy="720080"/>
+          </a:xfrm>
+          <a:prstGeom prst="ellipse">
+            <a:avLst/>
+          </a:prstGeom>
+          <a:solidFill>
+            <a:schemeClr val="accent1">
+              <a:lumMod val="40000"/>
+              <a:lumOff val="60000"/>
+            </a:schemeClr>
+          </a:solidFill>
+          <a:ln>
+            <a:solidFill>
+              <a:schemeClr val="tx1"/>
+            </a:solidFill>
+          </a:ln>
+        </p:spPr>
+        <p:style>
+          <a:lnRef idx="2">
+            <a:schemeClr val="accent1">
+              <a:shade val="50000"/>
+            </a:schemeClr>
+          </a:lnRef>
+          <a:fillRef idx="1">
+            <a:schemeClr val="accent1"/>
+          </a:fillRef>
+          <a:effectRef idx="0">
+            <a:schemeClr val="accent1"/>
+          </a:effectRef>
+          <a:fontRef idx="minor">
+            <a:schemeClr val="lt1"/>
+          </a:fontRef>
+        </p:style>
+        <p:txBody>
+          <a:bodyPr rtlCol="0" anchor="ctr"/>
+          <a:lstStyle/>
+          <a:p>
+            <a:pPr algn="ctr"/>
+            <a:endParaRPr kumimoji="1" lang="ja-JP" altLang="en-US"/>
+          </a:p>
+        </p:txBody>
+      </p:sp>
+      <p:sp>
+        <p:nvSpPr>
+          <p:cNvPr id="6" name="テキスト ボックス 5"/>
+          <p:cNvSpPr txBox="1"/>
+          <p:nvPr/>
+        </p:nvSpPr>
+        <p:spPr>
+          <a:xfrm>
+            <a:off x="623392" y="2915652"/>
+            <a:ext cx="877163" cy="369332"/>
+          </a:xfrm>
+          <a:prstGeom prst="rect">
+            <a:avLst/>
+          </a:prstGeom>
+          <a:noFill/>
+        </p:spPr>
+        <p:txBody>
+          <a:bodyPr wrap="none" rtlCol="0">
+            <a:spAutoFit/>
+          </a:bodyPr>
+          <a:lstStyle/>
+          <a:p>
+            <a:r>
+              <a:rPr lang="ja-JP" altLang="en-US" dirty="0" smtClean="0"/>
+              <a:t>先手</a:t>
+            </a:r>
+            <a:r>
+              <a:rPr lang="ja-JP" altLang="en-US" dirty="0"/>
+              <a:t>番</a:t>
+            </a:r>
+            <a:endParaRPr kumimoji="1" lang="ja-JP" altLang="en-US" dirty="0"/>
+          </a:p>
+        </p:txBody>
+      </p:sp>
+      <p:cxnSp>
+        <p:nvCxnSpPr>
+          <p:cNvPr id="8" name="直線矢印コネクタ 7"/>
+          <p:cNvCxnSpPr>
+            <a:stCxn id="3" idx="4"/>
+            <a:endCxn id="5" idx="0"/>
+          </p:cNvCxnSpPr>
+          <p:nvPr/>
+        </p:nvCxnSpPr>
+        <p:spPr>
+          <a:xfrm>
+            <a:off x="2869664" y="3429000"/>
+            <a:ext cx="706056" cy="720080"/>
+          </a:xfrm>
+          <a:prstGeom prst="straightConnector1">
+            <a:avLst/>
+          </a:prstGeom>
+          <a:ln w="19050">
+            <a:solidFill>
+              <a:srgbClr val="FF0000"/>
+            </a:solidFill>
+            <a:tailEnd type="triangle"/>
+          </a:ln>
+        </p:spPr>
+        <p:style>
+          <a:lnRef idx="1">
+            <a:schemeClr val="accent1"/>
+          </a:lnRef>
+          <a:fillRef idx="0">
+            <a:schemeClr val="accent1"/>
+          </a:fillRef>
+          <a:effectRef idx="0">
+            <a:schemeClr val="accent1"/>
+          </a:effectRef>
+          <a:fontRef idx="minor">
+            <a:schemeClr val="tx1"/>
+          </a:fontRef>
+        </p:style>
+      </p:cxnSp>
+      <p:cxnSp>
+        <p:nvCxnSpPr>
+          <p:cNvPr id="10" name="直線矢印コネクタ 9"/>
+          <p:cNvCxnSpPr>
+            <a:stCxn id="3" idx="4"/>
+            <a:endCxn id="4" idx="0"/>
+          </p:cNvCxnSpPr>
+          <p:nvPr/>
+        </p:nvCxnSpPr>
+        <p:spPr>
+          <a:xfrm flipH="1">
+            <a:off x="2166536" y="3429000"/>
+            <a:ext cx="703128" cy="720080"/>
+          </a:xfrm>
+          <a:prstGeom prst="straightConnector1">
+            <a:avLst/>
+          </a:prstGeom>
+          <a:ln>
+            <a:solidFill>
+              <a:schemeClr val="tx1"/>
+            </a:solidFill>
+            <a:tailEnd type="triangle"/>
+          </a:ln>
+        </p:spPr>
+        <p:style>
+          <a:lnRef idx="1">
+            <a:schemeClr val="accent1"/>
+          </a:lnRef>
+          <a:fillRef idx="0">
+            <a:schemeClr val="accent1"/>
+          </a:fillRef>
+          <a:effectRef idx="0">
+            <a:schemeClr val="accent1"/>
+          </a:effectRef>
+          <a:fontRef idx="minor">
+            <a:schemeClr val="tx1"/>
+          </a:fontRef>
+        </p:style>
+      </p:cxnSp>
+      <p:sp>
+        <p:nvSpPr>
+          <p:cNvPr id="11" name="テキスト ボックス 10"/>
+          <p:cNvSpPr txBox="1"/>
+          <p:nvPr/>
+        </p:nvSpPr>
+        <p:spPr>
+          <a:xfrm>
+            <a:off x="610325" y="4355812"/>
+            <a:ext cx="877163" cy="369332"/>
+          </a:xfrm>
+          <a:prstGeom prst="rect">
+            <a:avLst/>
+          </a:prstGeom>
+          <a:noFill/>
+        </p:spPr>
+        <p:txBody>
+          <a:bodyPr wrap="none" rtlCol="0">
+            <a:spAutoFit/>
+          </a:bodyPr>
+          <a:lstStyle/>
+          <a:p>
+            <a:r>
+              <a:rPr lang="ja-JP" altLang="en-US" dirty="0" smtClean="0"/>
+              <a:t>後手番</a:t>
+            </a:r>
+            <a:endParaRPr kumimoji="1" lang="ja-JP" altLang="en-US" dirty="0"/>
+          </a:p>
+        </p:txBody>
+      </p:sp>
+      <p:sp>
+        <p:nvSpPr>
+          <p:cNvPr id="12" name="テキスト ボックス 11"/>
+          <p:cNvSpPr txBox="1"/>
+          <p:nvPr/>
+        </p:nvSpPr>
+        <p:spPr>
+          <a:xfrm>
+            <a:off x="623392" y="1475492"/>
+            <a:ext cx="877163" cy="369332"/>
+          </a:xfrm>
+          <a:prstGeom prst="rect">
+            <a:avLst/>
+          </a:prstGeom>
+          <a:noFill/>
+        </p:spPr>
+        <p:txBody>
+          <a:bodyPr wrap="none" rtlCol="0">
+            <a:spAutoFit/>
+          </a:bodyPr>
+          <a:lstStyle/>
+          <a:p>
+            <a:r>
+              <a:rPr lang="ja-JP" altLang="en-US" dirty="0"/>
+              <a:t>後手</a:t>
+            </a:r>
+            <a:r>
+              <a:rPr lang="ja-JP" altLang="en-US" dirty="0" smtClean="0"/>
+              <a:t>番</a:t>
+            </a:r>
+            <a:endParaRPr kumimoji="1" lang="ja-JP" altLang="en-US" dirty="0"/>
+          </a:p>
+        </p:txBody>
+      </p:sp>
+      <p:sp>
+        <p:nvSpPr>
+          <p:cNvPr id="13" name="楕円 12"/>
+          <p:cNvSpPr/>
+          <p:nvPr/>
+        </p:nvSpPr>
+        <p:spPr>
+          <a:xfrm>
+            <a:off x="3229704" y="1268760"/>
+            <a:ext cx="720080" cy="720080"/>
+          </a:xfrm>
+          <a:prstGeom prst="ellipse">
+            <a:avLst/>
+          </a:prstGeom>
+          <a:solidFill>
+            <a:schemeClr val="bg1"/>
+          </a:solidFill>
+          <a:ln>
+            <a:solidFill>
+              <a:schemeClr val="tx1"/>
+            </a:solidFill>
+          </a:ln>
+        </p:spPr>
+        <p:style>
+          <a:lnRef idx="2">
+            <a:schemeClr val="accent1">
+              <a:shade val="50000"/>
+            </a:schemeClr>
+          </a:lnRef>
+          <a:fillRef idx="1">
+            <a:schemeClr val="accent1"/>
+          </a:fillRef>
+          <a:effectRef idx="0">
+            <a:schemeClr val="accent1"/>
+          </a:effectRef>
+          <a:fontRef idx="minor">
+            <a:schemeClr val="lt1"/>
+          </a:fontRef>
+        </p:style>
+        <p:txBody>
+          <a:bodyPr rtlCol="0" anchor="ctr"/>
+          <a:lstStyle/>
+          <a:p>
+            <a:pPr algn="ctr"/>
+            <a:endParaRPr kumimoji="1" lang="ja-JP" altLang="en-US"/>
+          </a:p>
+        </p:txBody>
+      </p:sp>
+      <p:cxnSp>
+        <p:nvCxnSpPr>
+          <p:cNvPr id="15" name="直線矢印コネクタ 14"/>
+          <p:cNvCxnSpPr>
+            <a:stCxn id="13" idx="4"/>
+            <a:endCxn id="3" idx="0"/>
+          </p:cNvCxnSpPr>
+          <p:nvPr/>
+        </p:nvCxnSpPr>
+        <p:spPr>
+          <a:xfrm flipH="1">
+            <a:off x="2869664" y="1988840"/>
+            <a:ext cx="720080" cy="720080"/>
+          </a:xfrm>
+          <a:prstGeom prst="straightConnector1">
+            <a:avLst/>
+          </a:prstGeom>
+          <a:ln w="19050">
+            <a:solidFill>
+              <a:srgbClr val="FF0000"/>
+            </a:solidFill>
+            <a:tailEnd type="triangle"/>
+          </a:ln>
+        </p:spPr>
+        <p:style>
+          <a:lnRef idx="1">
+            <a:schemeClr val="accent1"/>
+          </a:lnRef>
+          <a:fillRef idx="0">
+            <a:schemeClr val="accent1"/>
+          </a:fillRef>
+          <a:effectRef idx="0">
+            <a:schemeClr val="accent1"/>
+          </a:effectRef>
+          <a:fontRef idx="minor">
+            <a:schemeClr val="tx1"/>
+          </a:fontRef>
+        </p:style>
+      </p:cxnSp>
+      <p:sp>
+        <p:nvSpPr>
+          <p:cNvPr id="16" name="楕円 15"/>
+          <p:cNvSpPr/>
+          <p:nvPr/>
+        </p:nvSpPr>
+        <p:spPr>
+          <a:xfrm>
+            <a:off x="3935760" y="2708920"/>
+            <a:ext cx="720080" cy="720080"/>
+          </a:xfrm>
+          <a:prstGeom prst="ellipse">
+            <a:avLst/>
+          </a:prstGeom>
+          <a:solidFill>
+            <a:schemeClr val="bg1"/>
+          </a:solidFill>
+          <a:ln>
+            <a:solidFill>
+              <a:schemeClr val="tx1"/>
+            </a:solidFill>
+            <a:prstDash val="dash"/>
+          </a:ln>
+        </p:spPr>
+        <p:style>
+          <a:lnRef idx="2">
+            <a:schemeClr val="accent1">
+              <a:shade val="50000"/>
+            </a:schemeClr>
+          </a:lnRef>
+          <a:fillRef idx="1">
+            <a:schemeClr val="accent1"/>
+          </a:fillRef>
+          <a:effectRef idx="0">
+            <a:schemeClr val="accent1"/>
+          </a:effectRef>
+          <a:fontRef idx="minor">
+            <a:schemeClr val="lt1"/>
+          </a:fontRef>
+        </p:style>
+        <p:txBody>
+          <a:bodyPr rtlCol="0" anchor="ctr"/>
+          <a:lstStyle/>
+          <a:p>
+            <a:pPr algn="ctr"/>
+            <a:endParaRPr kumimoji="1" lang="ja-JP" altLang="en-US"/>
+          </a:p>
+        </p:txBody>
+      </p:sp>
+      <p:cxnSp>
+        <p:nvCxnSpPr>
+          <p:cNvPr id="18" name="直線矢印コネクタ 17"/>
+          <p:cNvCxnSpPr>
+            <a:stCxn id="13" idx="4"/>
+            <a:endCxn id="16" idx="0"/>
+          </p:cNvCxnSpPr>
+          <p:nvPr/>
+        </p:nvCxnSpPr>
+        <p:spPr>
+          <a:xfrm>
+            <a:off x="3589744" y="1988840"/>
+            <a:ext cx="706056" cy="720080"/>
+          </a:xfrm>
+          <a:prstGeom prst="straightConnector1">
+            <a:avLst/>
+          </a:prstGeom>
+          <a:ln>
+            <a:solidFill>
+              <a:schemeClr val="tx1"/>
+            </a:solidFill>
+            <a:tailEnd type="triangle"/>
+          </a:ln>
+        </p:spPr>
+        <p:style>
+          <a:lnRef idx="1">
+            <a:schemeClr val="accent1"/>
+          </a:lnRef>
+          <a:fillRef idx="0">
+            <a:schemeClr val="accent1"/>
+          </a:fillRef>
+          <a:effectRef idx="0">
+            <a:schemeClr val="accent1"/>
+          </a:effectRef>
+          <a:fontRef idx="minor">
+            <a:schemeClr val="tx1"/>
+          </a:fontRef>
+        </p:style>
+      </p:cxnSp>
+      <p:sp>
+        <p:nvSpPr>
+          <p:cNvPr id="20" name="テキスト ボックス 19"/>
+          <p:cNvSpPr txBox="1"/>
+          <p:nvPr/>
+        </p:nvSpPr>
+        <p:spPr>
+          <a:xfrm>
+            <a:off x="2927648" y="4941168"/>
+            <a:ext cx="1338828" cy="369332"/>
+          </a:xfrm>
+          <a:prstGeom prst="rect">
+            <a:avLst/>
+          </a:prstGeom>
+          <a:noFill/>
+        </p:spPr>
+        <p:txBody>
+          <a:bodyPr wrap="none" rtlCol="0">
+            <a:spAutoFit/>
+          </a:bodyPr>
+          <a:lstStyle/>
+          <a:p>
+            <a:r>
+              <a:rPr lang="ja-JP" altLang="en-US" dirty="0" smtClean="0"/>
+              <a:t>後手の負け</a:t>
+            </a:r>
+            <a:endParaRPr kumimoji="1" lang="ja-JP" altLang="en-US" dirty="0"/>
+          </a:p>
+        </p:txBody>
+      </p:sp>
+      <p:sp>
+        <p:nvSpPr>
+          <p:cNvPr id="21" name="テキスト ボックス 20"/>
+          <p:cNvSpPr txBox="1"/>
+          <p:nvPr/>
+        </p:nvSpPr>
+        <p:spPr>
+          <a:xfrm>
+            <a:off x="2938800" y="2056492"/>
+            <a:ext cx="693791" cy="584775"/>
+          </a:xfrm>
+          <a:prstGeom prst="rect">
+            <a:avLst/>
+          </a:prstGeom>
+          <a:noFill/>
+        </p:spPr>
+        <p:txBody>
+          <a:bodyPr wrap="square" rtlCol="0">
+            <a:spAutoFit/>
+          </a:bodyPr>
+          <a:lstStyle/>
+          <a:p>
+            <a:r>
+              <a:rPr lang="en-US" altLang="ja-JP" sz="3200" b="1" dirty="0"/>
+              <a:t>×</a:t>
+            </a:r>
+            <a:endParaRPr kumimoji="1" lang="ja-JP" altLang="en-US" sz="3200" b="1" dirty="0"/>
+          </a:p>
+        </p:txBody>
+      </p:sp>
+      <p:sp>
+        <p:nvSpPr>
+          <p:cNvPr id="22" name="テキスト ボックス 21"/>
+          <p:cNvSpPr txBox="1"/>
+          <p:nvPr/>
+        </p:nvSpPr>
+        <p:spPr>
+          <a:xfrm>
+            <a:off x="1802840" y="611396"/>
+            <a:ext cx="3312368" cy="369332"/>
+          </a:xfrm>
+          <a:prstGeom prst="rect">
+            <a:avLst/>
+          </a:prstGeom>
+          <a:noFill/>
+        </p:spPr>
+        <p:txBody>
+          <a:bodyPr wrap="square" rtlCol="0">
+            <a:spAutoFit/>
+          </a:bodyPr>
+          <a:lstStyle/>
+          <a:p>
+            <a:r>
+              <a:rPr lang="ja-JP" altLang="en-US" dirty="0" smtClean="0"/>
+              <a:t>負けにつながる手は打たない</a:t>
+            </a:r>
+            <a:endParaRPr kumimoji="1" lang="ja-JP" altLang="en-US" dirty="0"/>
+          </a:p>
+        </p:txBody>
+      </p:sp>
+      <p:sp>
+        <p:nvSpPr>
+          <p:cNvPr id="23" name="楕円 22"/>
+          <p:cNvSpPr/>
+          <p:nvPr/>
+        </p:nvSpPr>
+        <p:spPr>
+          <a:xfrm>
+            <a:off x="8211323" y="2708920"/>
+            <a:ext cx="720080" cy="720080"/>
+          </a:xfrm>
+          <a:prstGeom prst="ellipse">
+            <a:avLst/>
+          </a:prstGeom>
+          <a:solidFill>
+            <a:schemeClr val="bg1"/>
+          </a:solidFill>
+          <a:ln>
+            <a:solidFill>
+              <a:schemeClr val="tx1"/>
+            </a:solidFill>
+          </a:ln>
+        </p:spPr>
+        <p:style>
+          <a:lnRef idx="2">
+            <a:schemeClr val="accent1">
+              <a:shade val="50000"/>
+            </a:schemeClr>
+          </a:lnRef>
+          <a:fillRef idx="1">
+            <a:schemeClr val="accent1"/>
+          </a:fillRef>
+          <a:effectRef idx="0">
+            <a:schemeClr val="accent1"/>
+          </a:effectRef>
+          <a:fontRef idx="minor">
+            <a:schemeClr val="lt1"/>
+          </a:fontRef>
+        </p:style>
+        <p:txBody>
+          <a:bodyPr rtlCol="0" anchor="ctr"/>
+          <a:lstStyle/>
+          <a:p>
+            <a:pPr algn="ctr"/>
+            <a:endParaRPr kumimoji="1" lang="ja-JP" altLang="en-US"/>
+          </a:p>
+        </p:txBody>
+      </p:sp>
+      <p:sp>
+        <p:nvSpPr>
+          <p:cNvPr id="24" name="楕円 23"/>
+          <p:cNvSpPr/>
+          <p:nvPr/>
+        </p:nvSpPr>
+        <p:spPr>
+          <a:xfrm>
+            <a:off x="7508195" y="4149080"/>
+            <a:ext cx="720080" cy="720080"/>
+          </a:xfrm>
+          <a:prstGeom prst="ellipse">
+            <a:avLst/>
+          </a:prstGeom>
+          <a:solidFill>
+            <a:schemeClr val="bg1"/>
+          </a:solidFill>
+          <a:ln>
+            <a:solidFill>
+              <a:schemeClr val="tx1"/>
+            </a:solidFill>
+          </a:ln>
+        </p:spPr>
+        <p:style>
+          <a:lnRef idx="2">
+            <a:schemeClr val="accent1">
+              <a:shade val="50000"/>
+            </a:schemeClr>
+          </a:lnRef>
+          <a:fillRef idx="1">
+            <a:schemeClr val="accent1"/>
+          </a:fillRef>
+          <a:effectRef idx="0">
+            <a:schemeClr val="accent1"/>
+          </a:effectRef>
+          <a:fontRef idx="minor">
+            <a:schemeClr val="lt1"/>
+          </a:fontRef>
+        </p:style>
+        <p:txBody>
+          <a:bodyPr rtlCol="0" anchor="ctr"/>
+          <a:lstStyle/>
+          <a:p>
+            <a:pPr algn="ctr"/>
+            <a:endParaRPr kumimoji="1" lang="ja-JP" altLang="en-US"/>
+          </a:p>
+        </p:txBody>
+      </p:sp>
+      <p:sp>
+        <p:nvSpPr>
+          <p:cNvPr id="25" name="楕円 24"/>
+          <p:cNvSpPr/>
+          <p:nvPr/>
+        </p:nvSpPr>
+        <p:spPr>
+          <a:xfrm>
+            <a:off x="8917379" y="4149080"/>
+            <a:ext cx="720080" cy="720080"/>
+          </a:xfrm>
+          <a:prstGeom prst="ellipse">
+            <a:avLst/>
+          </a:prstGeom>
+          <a:solidFill>
+            <a:schemeClr val="bg1"/>
+          </a:solidFill>
+          <a:ln>
+            <a:solidFill>
+              <a:schemeClr val="tx1"/>
+            </a:solidFill>
+          </a:ln>
+        </p:spPr>
+        <p:style>
+          <a:lnRef idx="2">
+            <a:schemeClr val="accent1">
+              <a:shade val="50000"/>
+            </a:schemeClr>
+          </a:lnRef>
+          <a:fillRef idx="1">
+            <a:schemeClr val="accent1"/>
+          </a:fillRef>
+          <a:effectRef idx="0">
+            <a:schemeClr val="accent1"/>
+          </a:effectRef>
+          <a:fontRef idx="minor">
+            <a:schemeClr val="lt1"/>
+          </a:fontRef>
+        </p:style>
+        <p:txBody>
+          <a:bodyPr rtlCol="0" anchor="ctr"/>
+          <a:lstStyle/>
+          <a:p>
+            <a:pPr algn="ctr"/>
+            <a:endParaRPr kumimoji="1" lang="ja-JP" altLang="en-US"/>
+          </a:p>
+        </p:txBody>
+      </p:sp>
+      <p:sp>
+        <p:nvSpPr>
+          <p:cNvPr id="26" name="テキスト ボックス 25"/>
+          <p:cNvSpPr txBox="1"/>
+          <p:nvPr/>
+        </p:nvSpPr>
+        <p:spPr>
+          <a:xfrm>
+            <a:off x="6325091" y="2915652"/>
+            <a:ext cx="877163" cy="369332"/>
+          </a:xfrm>
+          <a:prstGeom prst="rect">
+            <a:avLst/>
+          </a:prstGeom>
+          <a:noFill/>
+        </p:spPr>
+        <p:txBody>
+          <a:bodyPr wrap="none" rtlCol="0">
+            <a:spAutoFit/>
+          </a:bodyPr>
+          <a:lstStyle/>
+          <a:p>
+            <a:r>
+              <a:rPr lang="ja-JP" altLang="en-US" dirty="0" smtClean="0"/>
+              <a:t>先手</a:t>
+            </a:r>
+            <a:r>
+              <a:rPr lang="ja-JP" altLang="en-US" dirty="0"/>
+              <a:t>番</a:t>
+            </a:r>
+            <a:endParaRPr kumimoji="1" lang="ja-JP" altLang="en-US" dirty="0"/>
+          </a:p>
+        </p:txBody>
+      </p:sp>
+      <p:cxnSp>
+        <p:nvCxnSpPr>
+          <p:cNvPr id="27" name="直線矢印コネクタ 26"/>
+          <p:cNvCxnSpPr>
+            <a:stCxn id="23" idx="4"/>
+            <a:endCxn id="25" idx="0"/>
+          </p:cNvCxnSpPr>
+          <p:nvPr/>
+        </p:nvCxnSpPr>
+        <p:spPr>
+          <a:xfrm>
+            <a:off x="8571363" y="3429000"/>
+            <a:ext cx="706056" cy="720080"/>
+          </a:xfrm>
+          <a:prstGeom prst="straightConnector1">
+            <a:avLst/>
+          </a:prstGeom>
+          <a:ln w="19050">
+            <a:solidFill>
+              <a:srgbClr val="FF0000"/>
+            </a:solidFill>
+            <a:tailEnd type="triangle"/>
+          </a:ln>
+        </p:spPr>
+        <p:style>
+          <a:lnRef idx="1">
+            <a:schemeClr val="accent1"/>
+          </a:lnRef>
+          <a:fillRef idx="0">
+            <a:schemeClr val="accent1"/>
+          </a:fillRef>
+          <a:effectRef idx="0">
+            <a:schemeClr val="accent1"/>
+          </a:effectRef>
+          <a:fontRef idx="minor">
+            <a:schemeClr val="tx1"/>
+          </a:fontRef>
+        </p:style>
+      </p:cxnSp>
+      <p:cxnSp>
+        <p:nvCxnSpPr>
+          <p:cNvPr id="28" name="直線矢印コネクタ 27"/>
+          <p:cNvCxnSpPr>
+            <a:stCxn id="23" idx="4"/>
+            <a:endCxn id="24" idx="0"/>
+          </p:cNvCxnSpPr>
+          <p:nvPr/>
+        </p:nvCxnSpPr>
+        <p:spPr>
+          <a:xfrm flipH="1">
+            <a:off x="7868235" y="3429000"/>
+            <a:ext cx="703128" cy="720080"/>
+          </a:xfrm>
+          <a:prstGeom prst="straightConnector1">
+            <a:avLst/>
+          </a:prstGeom>
+          <a:ln>
+            <a:solidFill>
+              <a:schemeClr val="tx1"/>
+            </a:solidFill>
+            <a:tailEnd type="triangle"/>
+          </a:ln>
+        </p:spPr>
+        <p:style>
+          <a:lnRef idx="1">
+            <a:schemeClr val="accent1"/>
+          </a:lnRef>
+          <a:fillRef idx="0">
+            <a:schemeClr val="accent1"/>
+          </a:fillRef>
+          <a:effectRef idx="0">
+            <a:schemeClr val="accent1"/>
+          </a:effectRef>
+          <a:fontRef idx="minor">
+            <a:schemeClr val="tx1"/>
+          </a:fontRef>
+        </p:style>
+      </p:cxnSp>
+      <p:sp>
+        <p:nvSpPr>
+          <p:cNvPr id="29" name="テキスト ボックス 28"/>
+          <p:cNvSpPr txBox="1"/>
+          <p:nvPr/>
+        </p:nvSpPr>
+        <p:spPr>
+          <a:xfrm>
+            <a:off x="6312024" y="4355812"/>
+            <a:ext cx="877163" cy="369332"/>
+          </a:xfrm>
+          <a:prstGeom prst="rect">
+            <a:avLst/>
+          </a:prstGeom>
+          <a:noFill/>
+        </p:spPr>
+        <p:txBody>
+          <a:bodyPr wrap="none" rtlCol="0">
+            <a:spAutoFit/>
+          </a:bodyPr>
+          <a:lstStyle/>
+          <a:p>
+            <a:r>
+              <a:rPr lang="ja-JP" altLang="en-US" dirty="0" smtClean="0"/>
+              <a:t>後手番</a:t>
+            </a:r>
+            <a:endParaRPr kumimoji="1" lang="ja-JP" altLang="en-US" dirty="0"/>
+          </a:p>
+        </p:txBody>
+      </p:sp>
+      <p:sp>
+        <p:nvSpPr>
+          <p:cNvPr id="30" name="テキスト ボックス 29"/>
+          <p:cNvSpPr txBox="1"/>
+          <p:nvPr/>
+        </p:nvSpPr>
+        <p:spPr>
+          <a:xfrm>
+            <a:off x="6325091" y="1475492"/>
+            <a:ext cx="877163" cy="369332"/>
+          </a:xfrm>
+          <a:prstGeom prst="rect">
+            <a:avLst/>
+          </a:prstGeom>
+          <a:noFill/>
+        </p:spPr>
+        <p:txBody>
+          <a:bodyPr wrap="none" rtlCol="0">
+            <a:spAutoFit/>
+          </a:bodyPr>
+          <a:lstStyle/>
+          <a:p>
+            <a:r>
+              <a:rPr lang="ja-JP" altLang="en-US" dirty="0"/>
+              <a:t>後手</a:t>
+            </a:r>
+            <a:r>
+              <a:rPr lang="ja-JP" altLang="en-US" dirty="0" smtClean="0"/>
+              <a:t>番</a:t>
+            </a:r>
+            <a:endParaRPr kumimoji="1" lang="ja-JP" altLang="en-US" dirty="0"/>
+          </a:p>
+        </p:txBody>
+      </p:sp>
+      <p:sp>
+        <p:nvSpPr>
+          <p:cNvPr id="31" name="楕円 30"/>
+          <p:cNvSpPr/>
+          <p:nvPr/>
+        </p:nvSpPr>
+        <p:spPr>
+          <a:xfrm>
+            <a:off x="8931403" y="1268760"/>
+            <a:ext cx="720080" cy="720080"/>
+          </a:xfrm>
+          <a:prstGeom prst="ellipse">
+            <a:avLst/>
+          </a:prstGeom>
+          <a:solidFill>
+            <a:schemeClr val="bg1"/>
+          </a:solidFill>
+          <a:ln>
+            <a:solidFill>
+              <a:schemeClr val="tx1"/>
+            </a:solidFill>
+          </a:ln>
+        </p:spPr>
+        <p:style>
+          <a:lnRef idx="2">
+            <a:schemeClr val="accent1">
+              <a:shade val="50000"/>
+            </a:schemeClr>
+          </a:lnRef>
+          <a:fillRef idx="1">
+            <a:schemeClr val="accent1"/>
+          </a:fillRef>
+          <a:effectRef idx="0">
+            <a:schemeClr val="accent1"/>
+          </a:effectRef>
+          <a:fontRef idx="minor">
+            <a:schemeClr val="lt1"/>
+          </a:fontRef>
+        </p:style>
+        <p:txBody>
+          <a:bodyPr rtlCol="0" anchor="ctr"/>
+          <a:lstStyle/>
+          <a:p>
+            <a:pPr algn="ctr"/>
+            <a:endParaRPr kumimoji="1" lang="ja-JP" altLang="en-US"/>
+          </a:p>
+        </p:txBody>
+      </p:sp>
+      <p:cxnSp>
+        <p:nvCxnSpPr>
+          <p:cNvPr id="32" name="直線矢印コネクタ 31"/>
+          <p:cNvCxnSpPr>
+            <a:stCxn id="31" idx="4"/>
+            <a:endCxn id="23" idx="0"/>
+          </p:cNvCxnSpPr>
+          <p:nvPr/>
+        </p:nvCxnSpPr>
+        <p:spPr>
+          <a:xfrm flipH="1">
+            <a:off x="8571363" y="1988840"/>
+            <a:ext cx="720080" cy="720080"/>
+          </a:xfrm>
+          <a:prstGeom prst="straightConnector1">
+            <a:avLst/>
+          </a:prstGeom>
+          <a:ln w="19050">
+            <a:solidFill>
+              <a:srgbClr val="FF0000"/>
+            </a:solidFill>
+            <a:tailEnd type="triangle"/>
+          </a:ln>
+        </p:spPr>
+        <p:style>
+          <a:lnRef idx="1">
+            <a:schemeClr val="accent1"/>
+          </a:lnRef>
+          <a:fillRef idx="0">
+            <a:schemeClr val="accent1"/>
+          </a:fillRef>
+          <a:effectRef idx="0">
+            <a:schemeClr val="accent1"/>
+          </a:effectRef>
+          <a:fontRef idx="minor">
+            <a:schemeClr val="tx1"/>
+          </a:fontRef>
+        </p:style>
+      </p:cxnSp>
+      <p:sp>
+        <p:nvSpPr>
+          <p:cNvPr id="33" name="楕円 32"/>
+          <p:cNvSpPr/>
+          <p:nvPr/>
+        </p:nvSpPr>
+        <p:spPr>
+          <a:xfrm>
+            <a:off x="9637459" y="2708920"/>
+            <a:ext cx="720080" cy="720080"/>
+          </a:xfrm>
+          <a:prstGeom prst="ellipse">
+            <a:avLst/>
+          </a:prstGeom>
+          <a:solidFill>
+            <a:schemeClr val="bg1"/>
+          </a:solidFill>
+          <a:ln>
+            <a:solidFill>
+              <a:schemeClr val="tx1"/>
+            </a:solidFill>
+            <a:prstDash val="dash"/>
+          </a:ln>
+        </p:spPr>
+        <p:style>
+          <a:lnRef idx="2">
+            <a:schemeClr val="accent1">
+              <a:shade val="50000"/>
+            </a:schemeClr>
+          </a:lnRef>
+          <a:fillRef idx="1">
+            <a:schemeClr val="accent1"/>
+          </a:fillRef>
+          <a:effectRef idx="0">
+            <a:schemeClr val="accent1"/>
+          </a:effectRef>
+          <a:fontRef idx="minor">
+            <a:schemeClr val="lt1"/>
+          </a:fontRef>
+        </p:style>
+        <p:txBody>
+          <a:bodyPr rtlCol="0" anchor="ctr"/>
+          <a:lstStyle/>
+          <a:p>
+            <a:pPr algn="ctr"/>
+            <a:endParaRPr kumimoji="1" lang="ja-JP" altLang="en-US"/>
+          </a:p>
+        </p:txBody>
+      </p:sp>
+      <p:cxnSp>
+        <p:nvCxnSpPr>
+          <p:cNvPr id="34" name="直線矢印コネクタ 33"/>
+          <p:cNvCxnSpPr>
+            <a:stCxn id="31" idx="4"/>
+            <a:endCxn id="33" idx="0"/>
+          </p:cNvCxnSpPr>
+          <p:nvPr/>
+        </p:nvCxnSpPr>
+        <p:spPr>
+          <a:xfrm>
+            <a:off x="9291443" y="1988840"/>
+            <a:ext cx="706056" cy="720080"/>
+          </a:xfrm>
+          <a:prstGeom prst="straightConnector1">
+            <a:avLst/>
+          </a:prstGeom>
+          <a:ln>
+            <a:solidFill>
+              <a:schemeClr val="tx1"/>
+            </a:solidFill>
+            <a:tailEnd type="triangle"/>
+          </a:ln>
+        </p:spPr>
+        <p:style>
+          <a:lnRef idx="1">
+            <a:schemeClr val="accent1"/>
+          </a:lnRef>
+          <a:fillRef idx="0">
+            <a:schemeClr val="accent1"/>
+          </a:fillRef>
+          <a:effectRef idx="0">
+            <a:schemeClr val="accent1"/>
+          </a:effectRef>
+          <a:fontRef idx="minor">
+            <a:schemeClr val="tx1"/>
+          </a:fontRef>
+        </p:style>
+      </p:cxnSp>
+      <p:sp>
+        <p:nvSpPr>
+          <p:cNvPr id="36" name="テキスト ボックス 35"/>
+          <p:cNvSpPr txBox="1"/>
+          <p:nvPr/>
+        </p:nvSpPr>
+        <p:spPr>
+          <a:xfrm>
+            <a:off x="8642569" y="2052137"/>
+            <a:ext cx="693791" cy="584775"/>
+          </a:xfrm>
+          <a:prstGeom prst="rect">
+            <a:avLst/>
+          </a:prstGeom>
+          <a:noFill/>
+        </p:spPr>
+        <p:txBody>
+          <a:bodyPr wrap="square" rtlCol="0">
+            <a:spAutoFit/>
+          </a:bodyPr>
+          <a:lstStyle/>
+          <a:p>
+            <a:r>
+              <a:rPr lang="en-US" altLang="ja-JP" sz="3200" b="1" dirty="0"/>
+              <a:t>×</a:t>
+            </a:r>
+            <a:endParaRPr kumimoji="1" lang="ja-JP" altLang="en-US" sz="3200" b="1" dirty="0"/>
+          </a:p>
+        </p:txBody>
+      </p:sp>
+      <p:cxnSp>
+        <p:nvCxnSpPr>
+          <p:cNvPr id="37" name="直線矢印コネクタ 36"/>
+          <p:cNvCxnSpPr/>
+          <p:nvPr/>
+        </p:nvCxnSpPr>
+        <p:spPr>
+          <a:xfrm flipH="1">
+            <a:off x="8832304" y="4869160"/>
+            <a:ext cx="471389" cy="720080"/>
+          </a:xfrm>
+          <a:prstGeom prst="straightConnector1">
+            <a:avLst/>
+          </a:prstGeom>
+          <a:ln w="19050">
+            <a:solidFill>
+              <a:srgbClr val="FF0000"/>
+            </a:solidFill>
+            <a:tailEnd type="triangle"/>
+          </a:ln>
+        </p:spPr>
+        <p:style>
+          <a:lnRef idx="1">
+            <a:schemeClr val="accent1"/>
+          </a:lnRef>
+          <a:fillRef idx="0">
+            <a:schemeClr val="accent1"/>
+          </a:fillRef>
+          <a:effectRef idx="0">
+            <a:schemeClr val="accent1"/>
+          </a:effectRef>
+          <a:fontRef idx="minor">
+            <a:schemeClr val="tx1"/>
+          </a:fontRef>
+        </p:style>
+      </p:cxnSp>
+      <p:cxnSp>
+        <p:nvCxnSpPr>
+          <p:cNvPr id="39" name="直線矢印コネクタ 38"/>
+          <p:cNvCxnSpPr>
+            <a:stCxn id="25" idx="4"/>
+          </p:cNvCxnSpPr>
+          <p:nvPr/>
+        </p:nvCxnSpPr>
+        <p:spPr>
+          <a:xfrm>
+            <a:off x="9277419" y="4869160"/>
+            <a:ext cx="445115" cy="720080"/>
+          </a:xfrm>
+          <a:prstGeom prst="straightConnector1">
+            <a:avLst/>
+          </a:prstGeom>
+          <a:ln w="19050">
+            <a:solidFill>
+              <a:srgbClr val="FF0000"/>
+            </a:solidFill>
+            <a:tailEnd type="triangle"/>
+          </a:ln>
+        </p:spPr>
+        <p:style>
+          <a:lnRef idx="1">
+            <a:schemeClr val="accent1"/>
+          </a:lnRef>
+          <a:fillRef idx="0">
+            <a:schemeClr val="accent1"/>
+          </a:fillRef>
+          <a:effectRef idx="0">
+            <a:schemeClr val="accent1"/>
+          </a:effectRef>
+          <a:fontRef idx="minor">
+            <a:schemeClr val="tx1"/>
+          </a:fontRef>
+        </p:style>
+      </p:cxnSp>
+      <p:sp>
+        <p:nvSpPr>
+          <p:cNvPr id="42" name="テキスト ボックス 41"/>
+          <p:cNvSpPr txBox="1"/>
+          <p:nvPr/>
+        </p:nvSpPr>
+        <p:spPr>
+          <a:xfrm>
+            <a:off x="8714577" y="5004465"/>
+            <a:ext cx="693791" cy="584775"/>
+          </a:xfrm>
+          <a:prstGeom prst="rect">
+            <a:avLst/>
+          </a:prstGeom>
+          <a:noFill/>
+        </p:spPr>
+        <p:txBody>
+          <a:bodyPr wrap="square" rtlCol="0">
+            <a:spAutoFit/>
+          </a:bodyPr>
+          <a:lstStyle/>
+          <a:p>
+            <a:r>
+              <a:rPr lang="en-US" altLang="ja-JP" sz="3200" b="1" dirty="0"/>
+              <a:t>×</a:t>
+            </a:r>
+            <a:endParaRPr kumimoji="1" lang="ja-JP" altLang="en-US" sz="3200" b="1" dirty="0"/>
+          </a:p>
+        </p:txBody>
+      </p:sp>
+      <p:sp>
+        <p:nvSpPr>
+          <p:cNvPr id="43" name="テキスト ボックス 42"/>
+          <p:cNvSpPr txBox="1"/>
+          <p:nvPr/>
+        </p:nvSpPr>
+        <p:spPr>
+          <a:xfrm>
+            <a:off x="9264352" y="5004465"/>
+            <a:ext cx="693791" cy="584775"/>
+          </a:xfrm>
+          <a:prstGeom prst="rect">
+            <a:avLst/>
+          </a:prstGeom>
+          <a:noFill/>
+        </p:spPr>
+        <p:txBody>
+          <a:bodyPr wrap="square" rtlCol="0">
+            <a:spAutoFit/>
+          </a:bodyPr>
+          <a:lstStyle/>
+          <a:p>
+            <a:r>
+              <a:rPr lang="en-US" altLang="ja-JP" sz="3200" b="1" dirty="0"/>
+              <a:t>×</a:t>
+            </a:r>
+            <a:endParaRPr kumimoji="1" lang="ja-JP" altLang="en-US" sz="3200" b="1" dirty="0"/>
+          </a:p>
+        </p:txBody>
+      </p:sp>
+      <p:sp>
+        <p:nvSpPr>
+          <p:cNvPr id="44" name="テキスト ボックス 43"/>
+          <p:cNvSpPr txBox="1"/>
+          <p:nvPr/>
+        </p:nvSpPr>
+        <p:spPr>
+          <a:xfrm>
+            <a:off x="7536160" y="404664"/>
+            <a:ext cx="3312368" cy="646331"/>
+          </a:xfrm>
+          <a:prstGeom prst="rect">
+            <a:avLst/>
+          </a:prstGeom>
+          <a:noFill/>
+        </p:spPr>
+        <p:txBody>
+          <a:bodyPr wrap="square" rtlCol="0">
+            <a:spAutoFit/>
+          </a:bodyPr>
+          <a:lstStyle/>
+          <a:p>
+            <a:r>
+              <a:rPr lang="ja-JP" altLang="en-US" dirty="0" smtClean="0"/>
+              <a:t>打てる手がなくなってしまう状態につながる手は打たない</a:t>
+            </a:r>
+            <a:endParaRPr kumimoji="1" lang="ja-JP" altLang="en-US" dirty="0"/>
+          </a:p>
+        </p:txBody>
+      </p:sp>
+    </p:spTree>
+    <p:extLst>
+      <p:ext uri="{BB962C8B-B14F-4D97-AF65-F5344CB8AC3E}">
+        <p14:creationId xmlns:p14="http://schemas.microsoft.com/office/powerpoint/2010/main" val="2596043696"/>
+      </p:ext>
+    </p:extLst>
+  </p:cSld>
+  <p:clrMapOvr>
+    <a:masterClrMapping/>
+  </p:clrMapOvr>
+</p:sld>
+</file>
+
 <file path=ppt/theme/theme1.xml><?xml version="1.0" encoding="utf-8"?>
 <a:theme xmlns:a="http://schemas.openxmlformats.org/drawingml/2006/main" name="Office テーマ">
   <a:themeElements>

</xml_diff>